<commit_message>
Updated 2.1 SLide Show
</commit_message>
<xml_diff>
--- a/02-lesson-plans/02-Week/01-Day/Slide-Shows/Going_Live.pptx
+++ b/02-lesson-plans/02-Week/01-Day/Slide-Shows/Going_Live.pptx
@@ -181,10 +181,6 @@
 </p:presentation>
 </file>
 
-<file path=ppt/revisionInfo.xml><?xml version="1.0" encoding="utf-8"?>
-<p1510:revInfo xmlns:a="http://schemas.openxmlformats.org/drawingml/2006/main" xmlns:r="http://schemas.openxmlformats.org/officeDocument/2006/relationships" xmlns:p1510="http://schemas.microsoft.com/office/powerpoint/2015/10/main"/>
-</file>
-
 <file path=ppt/notesMasters/notesMaster1.xml><?xml version="1.0" encoding="utf-8"?>
 <p:notesMaster xmlns:a="http://schemas.openxmlformats.org/drawingml/2006/main" xmlns:r="http://schemas.openxmlformats.org/officeDocument/2006/relationships" xmlns:p="http://schemas.openxmlformats.org/presentationml/2006/main">
   <p:cSld>
@@ -2075,18 +2071,7 @@
                 <a:ea typeface="Roboto" panose="02000000000000000000" pitchFamily="2" charset="0"/>
                 <a:cs typeface="Arial" panose="020B0604020202020204" pitchFamily="34" charset="0"/>
               </a:rPr>
-              <a:t>The Coding </a:t>
-            </a:r>
-            <a:r>
-              <a:rPr lang="en-US" sz="2000" b="1" dirty="0" smtClean="0">
-                <a:solidFill>
-                  <a:schemeClr val="bg1"/>
-                </a:solidFill>
-                <a:latin typeface="Arial" panose="020B0604020202020204" pitchFamily="34" charset="0"/>
-                <a:ea typeface="Roboto" panose="02000000000000000000" pitchFamily="2" charset="0"/>
-                <a:cs typeface="Arial" panose="020B0604020202020204" pitchFamily="34" charset="0"/>
-              </a:rPr>
-              <a:t>Bootcamp</a:t>
+              <a:t>The Coding Bootcamp</a:t>
             </a:r>
             <a:endParaRPr lang="en-US" sz="2000" dirty="0">
               <a:solidFill>
@@ -2132,7 +2117,7 @@
           </a:lstStyle>
           <a:p>
             <a:r>
-              <a:rPr lang="en-US" smtClean="0"/>
+              <a:rPr lang="en-US"/>
               <a:t>Click to edit Master title style</a:t>
             </a:r>
             <a:endParaRPr lang="en-US" dirty="0"/>
@@ -2371,7 +2356,7 @@
           </a:lstStyle>
           <a:p>
             <a:r>
-              <a:rPr lang="en-US" smtClean="0"/>
+              <a:rPr lang="en-US"/>
               <a:t>Click to edit Master title style</a:t>
             </a:r>
             <a:endParaRPr lang="en-US" dirty="0"/>
@@ -2622,7 +2607,7 @@
           <a:p>
             <a:pPr lvl="0"/>
             <a:r>
-              <a:rPr lang="en-US" smtClean="0"/>
+              <a:rPr lang="en-US"/>
               <a:t>Click to edit Master title style</a:t>
             </a:r>
             <a:endParaRPr lang="en-US" dirty="0"/>
@@ -2758,7 +2743,7 @@
               </a14:hiddenLine>
             </a:ext>
             <a:ext uri="{FAA26D3D-D897-4be2-8F04-BA451C77F1D7}">
-              <ma14:placeholderFlag xmlns:ma14="http://schemas.microsoft.com/office/mac/drawingml/2011/main" val="1"/>
+              <ma14:placeholderFlag xmlns:ma14="http://schemas.microsoft.com/office/mac/drawingml/2011/main" xmlns="" val="1"/>
             </a:ext>
           </a:extLst>
         </p:spPr>
@@ -2819,7 +2804,7 @@
               </a14:hiddenLine>
             </a:ext>
             <a:ext uri="{FAA26D3D-D897-4be2-8F04-BA451C77F1D7}">
-              <ma14:placeholderFlag xmlns:ma14="http://schemas.microsoft.com/office/mac/drawingml/2011/main" val="1"/>
+              <ma14:placeholderFlag xmlns:ma14="http://schemas.microsoft.com/office/mac/drawingml/2011/main" xmlns="" val="1"/>
             </a:ext>
           </a:extLst>
         </p:spPr>
@@ -3351,10 +3336,9 @@
           <a:lstStyle/>
           <a:p>
             <a:r>
-              <a:rPr lang="en-US" dirty="0" smtClean="0"/>
+              <a:rPr lang="en-US" dirty="0"/>
               <a:t>Going Live</a:t>
             </a:r>
-            <a:endParaRPr lang="en-US" dirty="0"/>
           </a:p>
         </p:txBody>
       </p:sp>
@@ -3449,7 +3433,7 @@
           <p:cNvPr id="8" name="Picture 7">
             <a:extLst>
               <a:ext uri="{FF2B5EF4-FFF2-40B4-BE49-F238E27FC236}">
-                <a16:creationId xmlns:a16="http://schemas.microsoft.com/office/drawing/2014/main" xmlns="" id="{3970C109-8470-4251-9882-4BA83F43C243}"/>
+                <a16:creationId xmlns:a16="http://schemas.microsoft.com/office/drawing/2014/main" id="{3970C109-8470-4251-9882-4BA83F43C243}"/>
               </a:ext>
             </a:extLst>
           </p:cNvPr>
@@ -10029,16 +10013,7 @@
                 </a:solidFill>
                 <a:latin typeface="Arial"/>
               </a:rPr>
-              <a:t>CSS </a:t>
-            </a:r>
-            <a:r>
-              <a:rPr lang="en-US" dirty="0" smtClean="0">
-                <a:solidFill>
-                  <a:srgbClr val="FFFFFF"/>
-                </a:solidFill>
-                <a:latin typeface="Arial"/>
-              </a:rPr>
-              <a:t>Resets</a:t>
+              <a:t>CSS Resets</a:t>
             </a:r>
             <a:endParaRPr lang="en-US" dirty="0"/>
           </a:p>
@@ -10121,16 +10096,7 @@
                 </a:solidFill>
                 <a:latin typeface="Arial"/>
               </a:rPr>
-              <a:t>Files </a:t>
-            </a:r>
-            <a:r>
-              <a:rPr lang="en-US" sz="2400" b="1" strike="noStrike" smtClean="0">
-                <a:solidFill>
-                  <a:srgbClr val="000000"/>
-                </a:solidFill>
-                <a:latin typeface="Arial"/>
-              </a:rPr>
-              <a:t>***(</a:t>
+              <a:t>Files ***(</a:t>
             </a:r>
             <a:r>
               <a:rPr lang="en-US" sz="2400" b="1" strike="noStrike" dirty="0">
@@ -12147,16 +12113,7 @@
                 </a:solidFill>
                 <a:latin typeface="Arial"/>
               </a:rPr>
-              <a:t>To the Web with GitHub</a:t>
-            </a:r>
-            <a:r>
-              <a:rPr lang="en-US" dirty="0" smtClean="0">
-                <a:solidFill>
-                  <a:srgbClr val="FFFFFF"/>
-                </a:solidFill>
-                <a:latin typeface="Arial"/>
-              </a:rPr>
-              <a:t>!</a:t>
+              <a:t>To the Web with GitHub!</a:t>
             </a:r>
             <a:endParaRPr lang="en-US" dirty="0"/>
           </a:p>
@@ -14495,16 +14452,7 @@
                 </a:solidFill>
                 <a:latin typeface="Arial"/>
               </a:rPr>
-              <a:t>Questions</a:t>
-            </a:r>
-            <a:r>
-              <a:rPr lang="en-US" dirty="0" smtClean="0">
-                <a:solidFill>
-                  <a:srgbClr val="FFFFFF"/>
-                </a:solidFill>
-                <a:latin typeface="Arial"/>
-              </a:rPr>
-              <a:t>?</a:t>
+              <a:t>Questions?</a:t>
             </a:r>
             <a:endParaRPr lang="en-US" dirty="0"/>
           </a:p>
@@ -14572,16 +14520,7 @@
                 </a:solidFill>
                 <a:latin typeface="Arial"/>
               </a:rPr>
-              <a:t>Homework 1 - Help</a:t>
-            </a:r>
-            <a:r>
-              <a:rPr lang="en-US" dirty="0" smtClean="0">
-                <a:solidFill>
-                  <a:srgbClr val="FFFFFF"/>
-                </a:solidFill>
-                <a:latin typeface="Arial"/>
-              </a:rPr>
-              <a:t>?</a:t>
+              <a:t>Homework 1 - Help?</a:t>
             </a:r>
             <a:endParaRPr lang="en-US" dirty="0"/>
           </a:p>
@@ -17095,37 +17034,45 @@
                 </a:solidFill>
                 <a:latin typeface="Arial"/>
               </a:rPr>
-              <a:t> Homework Link: 
-</a:t>
-            </a:r>
-            <a:r>
-              <a:rPr lang="en-US" sz="2200" strike="noStrike" dirty="0">
-                <a:solidFill>
-                  <a:srgbClr val="000000"/>
-                </a:solidFill>
-                <a:latin typeface="Arial"/>
-              </a:rPr>
-              <a:t>&lt;&lt;&lt;&lt;&lt;INSERT LINK HERE&gt;&gt;&gt;&gt;&gt;</a:t>
-            </a:r>
-            <a:endParaRPr dirty="0"/>
-          </a:p>
-          <a:p>
-            <a:pPr>
-              <a:lnSpc>
-                <a:spcPct val="100000"/>
-              </a:lnSpc>
-            </a:pPr>
-            <a:endParaRPr dirty="0"/>
-          </a:p>
-          <a:p>
-            <a:pPr>
-              <a:lnSpc>
-                <a:spcPct val="100000"/>
-              </a:lnSpc>
+              <a:t> Homework Link: </a:t>
+            </a:r>
+          </a:p>
+          <a:p>
+            <a:pPr lvl="1">
               <a:buFont typeface="Arial"/>
               <a:buChar char="•"/>
             </a:pPr>
             <a:r>
+              <a:rPr lang="en-US" b="1" u="sng" dirty="0">
+                <a:solidFill>
+                  <a:srgbClr val="000000"/>
+                </a:solidFill>
+                <a:latin typeface="Arial"/>
+                <a:hlinkClick r:id="rId2"/>
+              </a:rPr>
+              <a:t> </a:t>
+            </a:r>
+            <a:r>
+              <a:rPr lang="en-US" dirty="0">
+                <a:hlinkClick r:id="rId2"/>
+              </a:rPr>
+              <a:t>/01-class-content/01-html-git-css/02-Homework/Instructions/recommended-homework-assignment.md</a:t>
+            </a:r>
+            <a:endParaRPr lang="en-US" dirty="0"/>
+          </a:p>
+          <a:p>
+            <a:pPr lvl="1"/>
+            <a:endParaRPr dirty="0"/>
+          </a:p>
+          <a:p>
+            <a:pPr>
+              <a:lnSpc>
+                <a:spcPct val="100000"/>
+              </a:lnSpc>
+              <a:buFont typeface="Arial"/>
+              <a:buChar char="•"/>
+            </a:pPr>
+            <a:r>
               <a:rPr lang="en-US" sz="2200" b="1" strike="noStrike" dirty="0">
                 <a:solidFill>
                   <a:srgbClr val="000000"/>
@@ -17150,27 +17097,23 @@
                 </a:solidFill>
                 <a:latin typeface="Arial"/>
               </a:rPr>
-              <a:t>):
-</a:t>
-            </a:r>
-            <a:r>
-              <a:rPr lang="en-US" sz="2200" strike="noStrike" dirty="0">
-                <a:solidFill>
-                  <a:srgbClr val="000000"/>
-                </a:solidFill>
-                <a:latin typeface="Arial"/>
-              </a:rPr>
-              <a:t>&lt;&lt;&lt;&lt;&lt;INSERT LINK HERE&gt;&gt;&gt;&gt;&gt;</a:t>
-            </a:r>
-            <a:endParaRPr dirty="0"/>
-          </a:p>
-          <a:p>
-            <a:pPr>
-              <a:lnSpc>
-                <a:spcPct val="100000"/>
-              </a:lnSpc>
-            </a:pPr>
-            <a:endParaRPr dirty="0"/>
+              <a:t>):</a:t>
+            </a:r>
+          </a:p>
+          <a:p>
+            <a:pPr lvl="1">
+              <a:buFont typeface="Arial"/>
+              <a:buChar char="•"/>
+            </a:pPr>
+            <a:r>
+              <a:rPr lang="en-US" dirty="0"/>
+              <a:t> </a:t>
+            </a:r>
+            <a:r>
+              <a:rPr lang="en-US" u="sng" dirty="0"/>
+              <a:t>02-lesson-plans/01-Week/02-Day/Supplemental/GitHub-Help</a:t>
+            </a:r>
+            <a:endParaRPr lang="en-US" dirty="0"/>
           </a:p>
         </p:txBody>
       </p:sp>
@@ -20838,13 +20781,23 @@
 </a:t>
             </a:r>
             <a:r>
-              <a:rPr lang="en-US" sz="2200" strike="noStrike" dirty="0">
-                <a:solidFill>
-                  <a:srgbClr val="000000"/>
-                </a:solidFill>
-                <a:latin typeface="Arial"/>
-              </a:rPr>
-              <a:t>&lt;&lt;&lt;&lt;INSERT LINK&gt;&gt;&gt;</a:t>
+              <a:rPr lang="en-US" sz="2200" dirty="0">
+                <a:solidFill>
+                  <a:srgbClr val="000000"/>
+                </a:solidFill>
+                <a:latin typeface="Arial"/>
+              </a:rPr>
+              <a:t> </a:t>
+            </a:r>
+            <a:r>
+              <a:rPr lang="en-US" sz="2200" dirty="0">
+                <a:solidFill>
+                  <a:srgbClr val="000000"/>
+                </a:solidFill>
+                <a:latin typeface="Arial"/>
+                <a:hlinkClick r:id="rId2"/>
+              </a:rPr>
+              <a:t>https://gt.bootcampcontent.com/GT-Coding-Boot-Camp/GTATL201802FSF1-Class-Repository-FSF/tree/master</a:t>
             </a:r>
             <a:endParaRPr dirty="0"/>
           </a:p>
@@ -20882,15 +20835,21 @@
               </a:lnSpc>
             </a:pPr>
             <a:r>
-              <a:rPr lang="en-US" sz="2200" strike="noStrike" dirty="0">
-                <a:solidFill>
-                  <a:srgbClr val="000000"/>
-                </a:solidFill>
-                <a:latin typeface="Arial"/>
-              </a:rPr>
-              <a:t>&lt;&lt;&lt;INSERT LINK&gt;&gt;&gt;&gt;</a:t>
-            </a:r>
-            <a:endParaRPr dirty="0"/>
+              <a:rPr lang="en-US" sz="2200" dirty="0">
+                <a:solidFill>
+                  <a:srgbClr val="000000"/>
+                </a:solidFill>
+                <a:latin typeface="Arial"/>
+                <a:hlinkClick r:id="rId3"/>
+              </a:rPr>
+              <a:t>https://codingbootcamp.hosted.panopto.com/Panopto/Pages/Sessions/List.aspx#folderID=%2258f0986d-28cd-44f4-a8a4-a87f017e4965%22&amp;folderSets=3</a:t>
+            </a:r>
+            <a:endParaRPr lang="en-US" sz="2200" dirty="0">
+              <a:solidFill>
+                <a:srgbClr val="000000"/>
+              </a:solidFill>
+              <a:latin typeface="Arial"/>
+            </a:endParaRPr>
           </a:p>
           <a:p>
             <a:pPr>

</xml_diff>